<commit_message>
Updated for GitHub and Web Site
</commit_message>
<xml_diff>
--- a/doco/MovieCatalog-Images.pptx
+++ b/doco/MovieCatalog-Images.pptx
@@ -4173,6 +4173,36 @@
           </a:prstGeom>
         </p:spPr>
       </p:pic>
+      <p:pic>
+        <p:nvPicPr>
+          <p:cNvPr id="13" name="Picture 12">
+            <a:extLst>
+              <a:ext uri="{FF2B5EF4-FFF2-40B4-BE49-F238E27FC236}">
+                <a16:creationId xmlns:a16="http://schemas.microsoft.com/office/drawing/2014/main" id="{3DC91DE8-5891-4BCF-A0D9-2F6E34ACE103}"/>
+              </a:ext>
+            </a:extLst>
+          </p:cNvPr>
+          <p:cNvPicPr>
+            <a:picLocks noChangeAspect="1"/>
+          </p:cNvPicPr>
+          <p:nvPr/>
+        </p:nvPicPr>
+        <p:blipFill>
+          <a:blip r:embed="rId8"/>
+          <a:stretch>
+            <a:fillRect/>
+          </a:stretch>
+        </p:blipFill>
+        <p:spPr>
+          <a:xfrm>
+            <a:off x="5006313" y="5778293"/>
+            <a:ext cx="915361" cy="332071"/>
+          </a:xfrm>
+          <a:prstGeom prst="rect">
+            <a:avLst/>
+          </a:prstGeom>
+        </p:spPr>
+      </p:pic>
     </p:spTree>
     <p:extLst>
       <p:ext uri="{BB962C8B-B14F-4D97-AF65-F5344CB8AC3E}">

</xml_diff>